<commit_message>
Slides apresentação versão final
</commit_message>
<xml_diff>
--- a/Documentação/Colheita Urbana.pptx
+++ b/Documentação/Colheita Urbana.pptx
@@ -14,6 +14,7 @@
     <p:sldId id="262" r:id="rId8"/>
     <p:sldId id="263" r:id="rId9"/>
     <p:sldId id="264" r:id="rId10"/>
+    <p:sldId id="265" r:id="rId11"/>
   </p:sldIdLst>
   <p:sldSz cx="12192000" cy="6858000"/>
   <p:notesSz cx="6858000" cy="9144000"/>
@@ -114,7 +115,7 @@
   </p:defaultTextStyle>
   <p:extLst>
     <p:ext uri="{EFAFB233-063F-42B5-8137-9DF3F51BA10A}">
-      <p15:sldGuideLst xmlns:p15="http://schemas.microsoft.com/office/powerpoint/2012/main" xmlns="">
+      <p15:sldGuideLst xmlns:p15="http://schemas.microsoft.com/office/powerpoint/2012/main">
         <p15:guide id="1" orient="horz" pos="2160">
           <p15:clr>
             <a:srgbClr val="A4A3A4"/>
@@ -6217,7 +6218,110 @@
     </p:spTree>
     <p:extLst>
       <p:ext uri="{BB962C8B-B14F-4D97-AF65-F5344CB8AC3E}">
-        <p14:creationId xmlns:p14="http://schemas.microsoft.com/office/powerpoint/2010/main" xmlns="" val="2093833439"/>
+        <p14:creationId xmlns:p14="http://schemas.microsoft.com/office/powerpoint/2010/main" val="2093833439"/>
+      </p:ext>
+    </p:extLst>
+  </p:cSld>
+  <p:clrMapOvr>
+    <a:masterClrMapping/>
+  </p:clrMapOvr>
+  <p:timing>
+    <p:tnLst>
+      <p:par>
+        <p:cTn id="1" dur="indefinite" restart="never" nodeType="tmRoot"/>
+      </p:par>
+    </p:tnLst>
+  </p:timing>
+</p:sld>
+</file>
+
+<file path=ppt/slides/slide10.xml><?xml version="1.0" encoding="utf-8"?>
+<p:sld xmlns:a="http://schemas.openxmlformats.org/drawingml/2006/main" xmlns:r="http://schemas.openxmlformats.org/officeDocument/2006/relationships" xmlns:p="http://schemas.openxmlformats.org/presentationml/2006/main">
+  <p:cSld>
+    <p:spTree>
+      <p:nvGrpSpPr>
+        <p:cNvPr id="1" name=""/>
+        <p:cNvGrpSpPr/>
+        <p:nvPr/>
+      </p:nvGrpSpPr>
+      <p:grpSpPr>
+        <a:xfrm>
+          <a:off x="0" y="0"/>
+          <a:ext cx="0" cy="0"/>
+          <a:chOff x="0" y="0"/>
+          <a:chExt cx="0" cy="0"/>
+        </a:xfrm>
+      </p:grpSpPr>
+      <p:sp>
+        <p:nvSpPr>
+          <p:cNvPr id="2" name="Título 1"/>
+          <p:cNvSpPr>
+            <a:spLocks noGrp="1"/>
+          </p:cNvSpPr>
+          <p:nvPr>
+            <p:ph type="title"/>
+          </p:nvPr>
+        </p:nvSpPr>
+        <p:spPr/>
+        <p:txBody>
+          <a:bodyPr/>
+          <a:lstStyle/>
+          <a:p>
+            <a:r>
+              <a:rPr lang="pt-BR" dirty="0" smtClean="0"/>
+              <a:t>Desafios e perspectivas</a:t>
+            </a:r>
+            <a:endParaRPr lang="pt-BR" dirty="0"/>
+          </a:p>
+        </p:txBody>
+      </p:sp>
+      <p:sp>
+        <p:nvSpPr>
+          <p:cNvPr id="3" name="Espaço Reservado para Conteúdo 2"/>
+          <p:cNvSpPr>
+            <a:spLocks noGrp="1"/>
+          </p:cNvSpPr>
+          <p:nvPr>
+            <p:ph idx="1"/>
+          </p:nvPr>
+        </p:nvSpPr>
+        <p:spPr/>
+        <p:txBody>
+          <a:bodyPr/>
+          <a:lstStyle/>
+          <a:p>
+            <a:r>
+              <a:rPr lang="pt-BR" dirty="0" smtClean="0"/>
+              <a:t>Um dos grandes desafios do projeto foi a manipulação de banco de dados, já não tínhamos muito conhecimento do assunto.</a:t>
+            </a:r>
+          </a:p>
+          <a:p>
+            <a:r>
+              <a:rPr lang="pt-BR" dirty="0" smtClean="0"/>
+              <a:t>Embora a arquitetura tenha sido muito bem escolhida, ela </a:t>
+            </a:r>
+            <a:r>
+              <a:rPr lang="pt-BR" dirty="0" err="1" smtClean="0"/>
+              <a:t>requeriu</a:t>
+            </a:r>
+            <a:r>
+              <a:rPr lang="pt-BR" dirty="0" smtClean="0"/>
+              <a:t> muita atenção na implementação</a:t>
+            </a:r>
+          </a:p>
+          <a:p>
+            <a:r>
+              <a:rPr lang="pt-BR" dirty="0" smtClean="0"/>
+              <a:t>No futuro, a falta de um designer na equipe dificultará a implementação de classes de estilização visual</a:t>
+            </a:r>
+            <a:endParaRPr lang="pt-BR" dirty="0"/>
+          </a:p>
+        </p:txBody>
+      </p:sp>
+    </p:spTree>
+    <p:extLst>
+      <p:ext uri="{BB962C8B-B14F-4D97-AF65-F5344CB8AC3E}">
+        <p14:creationId xmlns:p14="http://schemas.microsoft.com/office/powerpoint/2010/main" val="1559964815"/>
       </p:ext>
     </p:extLst>
   </p:cSld>
@@ -6348,7 +6452,7 @@
     </p:spTree>
     <p:extLst>
       <p:ext uri="{BB962C8B-B14F-4D97-AF65-F5344CB8AC3E}">
-        <p14:creationId xmlns:p14="http://schemas.microsoft.com/office/powerpoint/2010/main" xmlns="" val="3781100483"/>
+        <p14:creationId xmlns:p14="http://schemas.microsoft.com/office/powerpoint/2010/main" val="3781100483"/>
       </p:ext>
     </p:extLst>
   </p:cSld>
@@ -6434,7 +6538,7 @@
           <a:blip r:embed="rId2">
             <a:extLst>
               <a:ext uri="{28A0092B-C50C-407E-A947-70E740481C1C}">
-                <a14:useLocalDpi xmlns:a14="http://schemas.microsoft.com/office/drawing/2010/main" xmlns="" val="0"/>
+                <a14:useLocalDpi xmlns:a14="http://schemas.microsoft.com/office/drawing/2010/main" val="0"/>
               </a:ext>
             </a:extLst>
           </a:blip>
@@ -6455,7 +6559,7 @@
     </p:spTree>
     <p:extLst>
       <p:ext uri="{BB962C8B-B14F-4D97-AF65-F5344CB8AC3E}">
-        <p14:creationId xmlns:p14="http://schemas.microsoft.com/office/powerpoint/2010/main" xmlns="" val="2890008881"/>
+        <p14:creationId xmlns:p14="http://schemas.microsoft.com/office/powerpoint/2010/main" val="2890008881"/>
       </p:ext>
     </p:extLst>
   </p:cSld>
@@ -7297,7 +7401,7 @@
     </p:spTree>
     <p:extLst>
       <p:ext uri="{BB962C8B-B14F-4D97-AF65-F5344CB8AC3E}">
-        <p14:creationId xmlns:p14="http://schemas.microsoft.com/office/powerpoint/2010/main" xmlns="" val="3089740947"/>
+        <p14:creationId xmlns:p14="http://schemas.microsoft.com/office/powerpoint/2010/main" val="3089740947"/>
       </p:ext>
     </p:extLst>
   </p:cSld>
@@ -7403,7 +7507,7 @@
     </p:spTree>
     <p:extLst>
       <p:ext uri="{BB962C8B-B14F-4D97-AF65-F5344CB8AC3E}">
-        <p14:creationId xmlns:p14="http://schemas.microsoft.com/office/powerpoint/2010/main" xmlns="" val="3104146540"/>
+        <p14:creationId xmlns:p14="http://schemas.microsoft.com/office/powerpoint/2010/main" val="3104146540"/>
       </p:ext>
     </p:extLst>
   </p:cSld>
@@ -8380,7 +8484,7 @@
     </p:spTree>
     <p:extLst>
       <p:ext uri="{BB962C8B-B14F-4D97-AF65-F5344CB8AC3E}">
-        <p14:creationId xmlns:p14="http://schemas.microsoft.com/office/powerpoint/2010/main" xmlns="" val="2133789711"/>
+        <p14:creationId xmlns:p14="http://schemas.microsoft.com/office/powerpoint/2010/main" val="2133789711"/>
       </p:ext>
     </p:extLst>
   </p:cSld>
@@ -8459,7 +8563,7 @@
           <a:blip r:embed="rId2">
             <a:extLst>
               <a:ext uri="{28A0092B-C50C-407E-A947-70E740481C1C}">
-                <a14:useLocalDpi xmlns:a14="http://schemas.microsoft.com/office/drawing/2010/main" xmlns="" val="0"/>
+                <a14:useLocalDpi xmlns:a14="http://schemas.microsoft.com/office/drawing/2010/main" val="0"/>
               </a:ext>
             </a:extLst>
           </a:blip>
@@ -8480,7 +8584,7 @@
     </p:spTree>
     <p:extLst>
       <p:ext uri="{BB962C8B-B14F-4D97-AF65-F5344CB8AC3E}">
-        <p14:creationId xmlns:p14="http://schemas.microsoft.com/office/powerpoint/2010/main" xmlns="" val="267948650"/>
+        <p14:creationId xmlns:p14="http://schemas.microsoft.com/office/powerpoint/2010/main" val="267948650"/>
       </p:ext>
     </p:extLst>
   </p:cSld>
@@ -8965,7 +9069,7 @@
     </p:spTree>
     <p:extLst>
       <p:ext uri="{BB962C8B-B14F-4D97-AF65-F5344CB8AC3E}">
-        <p14:creationId xmlns:p14="http://schemas.microsoft.com/office/powerpoint/2010/main" xmlns="" val="2116960364"/>
+        <p14:creationId xmlns:p14="http://schemas.microsoft.com/office/powerpoint/2010/main" val="2116960364"/>
       </p:ext>
     </p:extLst>
   </p:cSld>
@@ -9164,15 +9268,23 @@
           <a:p>
             <a:r>
               <a:rPr lang="pt-BR" dirty="0"/>
-              <a:t>Ferramenta de Versionamento: Git(Github servidor de armazenamento </a:t>
-            </a:r>
-            <a:r>
-              <a:rPr lang="pt-BR" dirty="0" smtClean="0"/>
-              <a:t>dos arquivos</a:t>
+              <a:t>Ferramenta de Versionamento: </a:t>
+            </a:r>
+            <a:r>
+              <a:rPr lang="pt-BR" dirty="0" err="1"/>
+              <a:t>Git</a:t>
             </a:r>
             <a:r>
               <a:rPr lang="pt-BR" dirty="0"/>
-              <a:t>)</a:t>
+              <a:t>(</a:t>
+            </a:r>
+            <a:r>
+              <a:rPr lang="pt-BR" dirty="0" err="1"/>
+              <a:t>Github</a:t>
+            </a:r>
+            <a:r>
+              <a:rPr lang="pt-BR" dirty="0"/>
+              <a:t> servidor de armazenamento dos arquivos)</a:t>
             </a:r>
           </a:p>
         </p:txBody>
@@ -9180,7 +9292,7 @@
     </p:spTree>
     <p:extLst>
       <p:ext uri="{BB962C8B-B14F-4D97-AF65-F5344CB8AC3E}">
-        <p14:creationId xmlns:p14="http://schemas.microsoft.com/office/powerpoint/2010/main" xmlns="" val="2943460901"/>
+        <p14:creationId xmlns:p14="http://schemas.microsoft.com/office/powerpoint/2010/main" val="2943460901"/>
       </p:ext>
     </p:extLst>
   </p:cSld>
@@ -9447,7 +9559,7 @@
   <a:extraClrSchemeLst/>
   <a:extLst>
     <a:ext uri="{05A4C25C-085E-4340-85A3-A5531E510DB2}">
-      <thm15:themeFamily xmlns:thm15="http://schemas.microsoft.com/office/thememl/2012/main" xmlns="" name="Parallax" id="{3388167B-A2EB-4685-9635-1831D9AEF8C4}" vid="{93B4CCAC-FD5A-4D59-B1AC-EAF45910B5A9}"/>
+      <thm15:themeFamily xmlns:thm15="http://schemas.microsoft.com/office/thememl/2012/main" name="Parallax" id="{3388167B-A2EB-4685-9635-1831D9AEF8C4}" vid="{93B4CCAC-FD5A-4D59-B1AC-EAF45910B5A9}"/>
     </a:ext>
   </a:extLst>
 </a:theme>

</xml_diff>